<commit_message>
updated gaga power pointer
</commit_message>
<xml_diff>
--- a/hclust.gaga/gaga-hclust.pptx
+++ b/hclust.gaga/gaga-hclust.pptx
@@ -1,11 +1,12 @@
 
 <file path=ppt/presentation.xml><?xml version="1.0" encoding="utf-8"?>
-<p:presentation xmlns:a="http://schemas.openxmlformats.org/drawingml/2006/main" xmlns:r="http://schemas.openxmlformats.org/officeDocument/2006/relationships" xmlns:mc="http://schemas.openxmlformats.org/markup-compatibility/2006" xmlns:mv="urn:schemas-microsoft-com:mac:vml" xmlns:p="http://schemas.openxmlformats.org/presentationml/2006/main" mc:Ignorable="mv" mc:PreserveAttributes="mv:*" saveSubsetFonts="1">
+<p:presentation xmlns:a="http://schemas.openxmlformats.org/drawingml/2006/main" xmlns:r="http://schemas.openxmlformats.org/officeDocument/2006/relationships" xmlns:p="http://schemas.openxmlformats.org/presentationml/2006/main" saveSubsetFonts="1">
   <p:sldMasterIdLst>
     <p:sldMasterId id="2147483648" r:id="rId1"/>
   </p:sldMasterIdLst>
   <p:sldIdLst>
     <p:sldId id="256" r:id="rId2"/>
+    <p:sldId id="257" r:id="rId3"/>
   </p:sldIdLst>
   <p:sldSz cx="9144000" cy="6858000" type="screen4x3"/>
   <p:notesSz cx="6858000" cy="9144000"/>
@@ -108,7 +109,7 @@
 </file>
 
 <file path=ppt/slideLayouts/slideLayout1.xml><?xml version="1.0" encoding="utf-8"?>
-<p:sldLayout xmlns:a="http://schemas.openxmlformats.org/drawingml/2006/main" xmlns:r="http://schemas.openxmlformats.org/officeDocument/2006/relationships" xmlns:mc="http://schemas.openxmlformats.org/markup-compatibility/2006" xmlns:mv="urn:schemas-microsoft-com:mac:vml" xmlns:p="http://schemas.openxmlformats.org/presentationml/2006/main" mc:Ignorable="mv" mc:PreserveAttributes="mv:*" type="title" preserve="1">
+<p:sldLayout xmlns:a="http://schemas.openxmlformats.org/drawingml/2006/main" xmlns:r="http://schemas.openxmlformats.org/officeDocument/2006/relationships" xmlns:p="http://schemas.openxmlformats.org/presentationml/2006/main" type="title" preserve="1">
   <p:cSld name="Title Slide">
     <p:spTree>
       <p:nvGrpSpPr>
@@ -289,7 +290,7 @@
             <a:fld id="{1D8BD707-D9CF-40AE-B4C6-C98DA3205C09}" type="datetimeFigureOut">
               <a:rPr lang="en-US" smtClean="0"/>
               <a:pPr/>
-              <a:t>3/13/12</a:t>
+              <a:t>3/23/14</a:t>
             </a:fld>
             <a:endParaRPr lang="en-US"/>
           </a:p>
@@ -347,7 +348,7 @@
 </file>
 
 <file path=ppt/slideLayouts/slideLayout10.xml><?xml version="1.0" encoding="utf-8"?>
-<p:sldLayout xmlns:a="http://schemas.openxmlformats.org/drawingml/2006/main" xmlns:r="http://schemas.openxmlformats.org/officeDocument/2006/relationships" xmlns:mc="http://schemas.openxmlformats.org/markup-compatibility/2006" xmlns:mv="urn:schemas-microsoft-com:mac:vml" xmlns:p="http://schemas.openxmlformats.org/presentationml/2006/main" mc:Ignorable="mv" mc:PreserveAttributes="mv:*" type="vertTx" preserve="1">
+<p:sldLayout xmlns:a="http://schemas.openxmlformats.org/drawingml/2006/main" xmlns:r="http://schemas.openxmlformats.org/officeDocument/2006/relationships" xmlns:p="http://schemas.openxmlformats.org/presentationml/2006/main" type="vertTx" preserve="1">
   <p:cSld name="Title and Vertical Text">
     <p:spTree>
       <p:nvGrpSpPr>
@@ -456,7 +457,7 @@
             <a:fld id="{1D8BD707-D9CF-40AE-B4C6-C98DA3205C09}" type="datetimeFigureOut">
               <a:rPr lang="en-US" smtClean="0"/>
               <a:pPr/>
-              <a:t>3/13/12</a:t>
+              <a:t>3/23/14</a:t>
             </a:fld>
             <a:endParaRPr lang="en-US"/>
           </a:p>
@@ -514,7 +515,7 @@
 </file>
 
 <file path=ppt/slideLayouts/slideLayout11.xml><?xml version="1.0" encoding="utf-8"?>
-<p:sldLayout xmlns:a="http://schemas.openxmlformats.org/drawingml/2006/main" xmlns:r="http://schemas.openxmlformats.org/officeDocument/2006/relationships" xmlns:mc="http://schemas.openxmlformats.org/markup-compatibility/2006" xmlns:mv="urn:schemas-microsoft-com:mac:vml" xmlns:p="http://schemas.openxmlformats.org/presentationml/2006/main" mc:Ignorable="mv" mc:PreserveAttributes="mv:*" type="vertTitleAndTx" preserve="1">
+<p:sldLayout xmlns:a="http://schemas.openxmlformats.org/drawingml/2006/main" xmlns:r="http://schemas.openxmlformats.org/officeDocument/2006/relationships" xmlns:p="http://schemas.openxmlformats.org/presentationml/2006/main" type="vertTitleAndTx" preserve="1">
   <p:cSld name="Vertical Title and Text">
     <p:spTree>
       <p:nvGrpSpPr>
@@ -633,7 +634,7 @@
             <a:fld id="{1D8BD707-D9CF-40AE-B4C6-C98DA3205C09}" type="datetimeFigureOut">
               <a:rPr lang="en-US" smtClean="0"/>
               <a:pPr/>
-              <a:t>3/13/12</a:t>
+              <a:t>3/23/14</a:t>
             </a:fld>
             <a:endParaRPr lang="en-US"/>
           </a:p>
@@ -691,7 +692,7 @@
 </file>
 
 <file path=ppt/slideLayouts/slideLayout2.xml><?xml version="1.0" encoding="utf-8"?>
-<p:sldLayout xmlns:a="http://schemas.openxmlformats.org/drawingml/2006/main" xmlns:r="http://schemas.openxmlformats.org/officeDocument/2006/relationships" xmlns:mc="http://schemas.openxmlformats.org/markup-compatibility/2006" xmlns:mv="urn:schemas-microsoft-com:mac:vml" xmlns:p="http://schemas.openxmlformats.org/presentationml/2006/main" mc:Ignorable="mv" mc:PreserveAttributes="mv:*" type="obj" preserve="1">
+<p:sldLayout xmlns:a="http://schemas.openxmlformats.org/drawingml/2006/main" xmlns:r="http://schemas.openxmlformats.org/officeDocument/2006/relationships" xmlns:p="http://schemas.openxmlformats.org/presentationml/2006/main" type="obj" preserve="1">
   <p:cSld name="Title and Content">
     <p:spTree>
       <p:nvGrpSpPr>
@@ -800,7 +801,7 @@
             <a:fld id="{1D8BD707-D9CF-40AE-B4C6-C98DA3205C09}" type="datetimeFigureOut">
               <a:rPr lang="en-US" smtClean="0"/>
               <a:pPr/>
-              <a:t>3/13/12</a:t>
+              <a:t>3/23/14</a:t>
             </a:fld>
             <a:endParaRPr lang="en-US"/>
           </a:p>
@@ -858,7 +859,7 @@
 </file>
 
 <file path=ppt/slideLayouts/slideLayout3.xml><?xml version="1.0" encoding="utf-8"?>
-<p:sldLayout xmlns:a="http://schemas.openxmlformats.org/drawingml/2006/main" xmlns:r="http://schemas.openxmlformats.org/officeDocument/2006/relationships" xmlns:mc="http://schemas.openxmlformats.org/markup-compatibility/2006" xmlns:mv="urn:schemas-microsoft-com:mac:vml" xmlns:p="http://schemas.openxmlformats.org/presentationml/2006/main" mc:Ignorable="mv" mc:PreserveAttributes="mv:*" type="secHead" preserve="1">
+<p:sldLayout xmlns:a="http://schemas.openxmlformats.org/drawingml/2006/main" xmlns:r="http://schemas.openxmlformats.org/officeDocument/2006/relationships" xmlns:p="http://schemas.openxmlformats.org/presentationml/2006/main" type="secHead" preserve="1">
   <p:cSld name="Section Header">
     <p:spTree>
       <p:nvGrpSpPr>
@@ -1043,7 +1044,7 @@
             <a:fld id="{1D8BD707-D9CF-40AE-B4C6-C98DA3205C09}" type="datetimeFigureOut">
               <a:rPr lang="en-US" smtClean="0"/>
               <a:pPr/>
-              <a:t>3/13/12</a:t>
+              <a:t>3/23/14</a:t>
             </a:fld>
             <a:endParaRPr lang="en-US"/>
           </a:p>
@@ -1101,7 +1102,7 @@
 </file>
 
 <file path=ppt/slideLayouts/slideLayout4.xml><?xml version="1.0" encoding="utf-8"?>
-<p:sldLayout xmlns:a="http://schemas.openxmlformats.org/drawingml/2006/main" xmlns:r="http://schemas.openxmlformats.org/officeDocument/2006/relationships" xmlns:mc="http://schemas.openxmlformats.org/markup-compatibility/2006" xmlns:mv="urn:schemas-microsoft-com:mac:vml" xmlns:p="http://schemas.openxmlformats.org/presentationml/2006/main" mc:Ignorable="mv" mc:PreserveAttributes="mv:*" type="twoObj" preserve="1">
+<p:sldLayout xmlns:a="http://schemas.openxmlformats.org/drawingml/2006/main" xmlns:r="http://schemas.openxmlformats.org/officeDocument/2006/relationships" xmlns:p="http://schemas.openxmlformats.org/presentationml/2006/main" type="twoObj" preserve="1">
   <p:cSld name="Two Content">
     <p:spTree>
       <p:nvGrpSpPr>
@@ -1328,7 +1329,7 @@
             <a:fld id="{1D8BD707-D9CF-40AE-B4C6-C98DA3205C09}" type="datetimeFigureOut">
               <a:rPr lang="en-US" smtClean="0"/>
               <a:pPr/>
-              <a:t>3/13/12</a:t>
+              <a:t>3/23/14</a:t>
             </a:fld>
             <a:endParaRPr lang="en-US"/>
           </a:p>
@@ -1386,7 +1387,7 @@
 </file>
 
 <file path=ppt/slideLayouts/slideLayout5.xml><?xml version="1.0" encoding="utf-8"?>
-<p:sldLayout xmlns:a="http://schemas.openxmlformats.org/drawingml/2006/main" xmlns:r="http://schemas.openxmlformats.org/officeDocument/2006/relationships" xmlns:mc="http://schemas.openxmlformats.org/markup-compatibility/2006" xmlns:mv="urn:schemas-microsoft-com:mac:vml" xmlns:p="http://schemas.openxmlformats.org/presentationml/2006/main" mc:Ignorable="mv" mc:PreserveAttributes="mv:*" type="twoTxTwoObj" preserve="1">
+<p:sldLayout xmlns:a="http://schemas.openxmlformats.org/drawingml/2006/main" xmlns:r="http://schemas.openxmlformats.org/officeDocument/2006/relationships" xmlns:p="http://schemas.openxmlformats.org/presentationml/2006/main" type="twoTxTwoObj" preserve="1">
   <p:cSld name="Comparison">
     <p:spTree>
       <p:nvGrpSpPr>
@@ -1747,7 +1748,7 @@
             <a:fld id="{1D8BD707-D9CF-40AE-B4C6-C98DA3205C09}" type="datetimeFigureOut">
               <a:rPr lang="en-US" smtClean="0"/>
               <a:pPr/>
-              <a:t>3/13/12</a:t>
+              <a:t>3/23/14</a:t>
             </a:fld>
             <a:endParaRPr lang="en-US"/>
           </a:p>
@@ -1805,7 +1806,7 @@
 </file>
 
 <file path=ppt/slideLayouts/slideLayout6.xml><?xml version="1.0" encoding="utf-8"?>
-<p:sldLayout xmlns:a="http://schemas.openxmlformats.org/drawingml/2006/main" xmlns:r="http://schemas.openxmlformats.org/officeDocument/2006/relationships" xmlns:mc="http://schemas.openxmlformats.org/markup-compatibility/2006" xmlns:mv="urn:schemas-microsoft-com:mac:vml" xmlns:p="http://schemas.openxmlformats.org/presentationml/2006/main" mc:Ignorable="mv" mc:PreserveAttributes="mv:*" type="titleOnly" preserve="1">
+<p:sldLayout xmlns:a="http://schemas.openxmlformats.org/drawingml/2006/main" xmlns:r="http://schemas.openxmlformats.org/officeDocument/2006/relationships" xmlns:p="http://schemas.openxmlformats.org/presentationml/2006/main" type="titleOnly" preserve="1">
   <p:cSld name="Title Only">
     <p:spTree>
       <p:nvGrpSpPr>
@@ -1862,7 +1863,7 @@
             <a:fld id="{1D8BD707-D9CF-40AE-B4C6-C98DA3205C09}" type="datetimeFigureOut">
               <a:rPr lang="en-US" smtClean="0"/>
               <a:pPr/>
-              <a:t>3/13/12</a:t>
+              <a:t>3/23/14</a:t>
             </a:fld>
             <a:endParaRPr lang="en-US"/>
           </a:p>
@@ -1920,7 +1921,7 @@
 </file>
 
 <file path=ppt/slideLayouts/slideLayout7.xml><?xml version="1.0" encoding="utf-8"?>
-<p:sldLayout xmlns:a="http://schemas.openxmlformats.org/drawingml/2006/main" xmlns:r="http://schemas.openxmlformats.org/officeDocument/2006/relationships" xmlns:mc="http://schemas.openxmlformats.org/markup-compatibility/2006" xmlns:mv="urn:schemas-microsoft-com:mac:vml" xmlns:p="http://schemas.openxmlformats.org/presentationml/2006/main" mc:Ignorable="mv" mc:PreserveAttributes="mv:*" type="blank" preserve="1">
+<p:sldLayout xmlns:a="http://schemas.openxmlformats.org/drawingml/2006/main" xmlns:r="http://schemas.openxmlformats.org/officeDocument/2006/relationships" xmlns:p="http://schemas.openxmlformats.org/presentationml/2006/main" type="blank" preserve="1">
   <p:cSld name="Blank">
     <p:spTree>
       <p:nvGrpSpPr>
@@ -1954,7 +1955,7 @@
             <a:fld id="{1D8BD707-D9CF-40AE-B4C6-C98DA3205C09}" type="datetimeFigureOut">
               <a:rPr lang="en-US" smtClean="0"/>
               <a:pPr/>
-              <a:t>3/13/12</a:t>
+              <a:t>3/23/14</a:t>
             </a:fld>
             <a:endParaRPr lang="en-US"/>
           </a:p>
@@ -2012,7 +2013,7 @@
 </file>
 
 <file path=ppt/slideLayouts/slideLayout8.xml><?xml version="1.0" encoding="utf-8"?>
-<p:sldLayout xmlns:a="http://schemas.openxmlformats.org/drawingml/2006/main" xmlns:r="http://schemas.openxmlformats.org/officeDocument/2006/relationships" xmlns:mc="http://schemas.openxmlformats.org/markup-compatibility/2006" xmlns:mv="urn:schemas-microsoft-com:mac:vml" xmlns:p="http://schemas.openxmlformats.org/presentationml/2006/main" mc:Ignorable="mv" mc:PreserveAttributes="mv:*" type="objTx" preserve="1">
+<p:sldLayout xmlns:a="http://schemas.openxmlformats.org/drawingml/2006/main" xmlns:r="http://schemas.openxmlformats.org/officeDocument/2006/relationships" xmlns:p="http://schemas.openxmlformats.org/presentationml/2006/main" type="objTx" preserve="1">
   <p:cSld name="Content with Caption">
     <p:spTree>
       <p:nvGrpSpPr>
@@ -2228,7 +2229,7 @@
             <a:fld id="{1D8BD707-D9CF-40AE-B4C6-C98DA3205C09}" type="datetimeFigureOut">
               <a:rPr lang="en-US" smtClean="0"/>
               <a:pPr/>
-              <a:t>3/13/12</a:t>
+              <a:t>3/23/14</a:t>
             </a:fld>
             <a:endParaRPr lang="en-US"/>
           </a:p>
@@ -2286,7 +2287,7 @@
 </file>
 
 <file path=ppt/slideLayouts/slideLayout9.xml><?xml version="1.0" encoding="utf-8"?>
-<p:sldLayout xmlns:a="http://schemas.openxmlformats.org/drawingml/2006/main" xmlns:r="http://schemas.openxmlformats.org/officeDocument/2006/relationships" xmlns:mc="http://schemas.openxmlformats.org/markup-compatibility/2006" xmlns:mv="urn:schemas-microsoft-com:mac:vml" xmlns:p="http://schemas.openxmlformats.org/presentationml/2006/main" mc:Ignorable="mv" mc:PreserveAttributes="mv:*" type="picTx" preserve="1">
+<p:sldLayout xmlns:a="http://schemas.openxmlformats.org/drawingml/2006/main" xmlns:r="http://schemas.openxmlformats.org/officeDocument/2006/relationships" xmlns:p="http://schemas.openxmlformats.org/presentationml/2006/main" type="picTx" preserve="1">
   <p:cSld name="Picture with Caption">
     <p:spTree>
       <p:nvGrpSpPr>
@@ -2478,7 +2479,7 @@
             <a:fld id="{1D8BD707-D9CF-40AE-B4C6-C98DA3205C09}" type="datetimeFigureOut">
               <a:rPr lang="en-US" smtClean="0"/>
               <a:pPr/>
-              <a:t>3/13/12</a:t>
+              <a:t>3/23/14</a:t>
             </a:fld>
             <a:endParaRPr lang="en-US"/>
           </a:p>
@@ -2536,7 +2537,7 @@
 </file>
 
 <file path=ppt/slideMasters/slideMaster1.xml><?xml version="1.0" encoding="utf-8"?>
-<p:sldMaster xmlns:a="http://schemas.openxmlformats.org/drawingml/2006/main" xmlns:r="http://schemas.openxmlformats.org/officeDocument/2006/relationships" xmlns:mc="http://schemas.openxmlformats.org/markup-compatibility/2006" xmlns:mv="urn:schemas-microsoft-com:mac:vml" xmlns:p="http://schemas.openxmlformats.org/presentationml/2006/main" mc:Ignorable="mv" mc:PreserveAttributes="mv:*">
+<p:sldMaster xmlns:a="http://schemas.openxmlformats.org/drawingml/2006/main" xmlns:r="http://schemas.openxmlformats.org/officeDocument/2006/relationships" xmlns:p="http://schemas.openxmlformats.org/presentationml/2006/main">
   <p:cSld>
     <p:bg>
       <p:bgRef idx="1001">
@@ -2688,7 +2689,7 @@
             <a:fld id="{1D8BD707-D9CF-40AE-B4C6-C98DA3205C09}" type="datetimeFigureOut">
               <a:rPr lang="en-US" smtClean="0"/>
               <a:pPr/>
-              <a:t>3/13/12</a:t>
+              <a:t>3/23/14</a:t>
             </a:fld>
             <a:endParaRPr lang="en-US"/>
           </a:p>
@@ -3043,7 +3044,7 @@
 </file>
 
 <file path=ppt/slides/slide1.xml><?xml version="1.0" encoding="utf-8"?>
-<p:sld xmlns:a="http://schemas.openxmlformats.org/drawingml/2006/main" xmlns:r="http://schemas.openxmlformats.org/officeDocument/2006/relationships" xmlns:mc="http://schemas.openxmlformats.org/markup-compatibility/2006" xmlns:mv="urn:schemas-microsoft-com:mac:vml" xmlns:p="http://schemas.openxmlformats.org/presentationml/2006/main" mc:Ignorable="mv" mc:PreserveAttributes="mv:*">
+<p:sld xmlns:a="http://schemas.openxmlformats.org/drawingml/2006/main" xmlns:r="http://schemas.openxmlformats.org/officeDocument/2006/relationships" xmlns:p="http://schemas.openxmlformats.org/presentationml/2006/main">
   <p:cSld>
     <p:spTree>
       <p:nvGrpSpPr>
@@ -3243,6 +3244,221 @@
         </p:txBody>
       </p:sp>
     </p:spTree>
+  </p:cSld>
+  <p:clrMapOvr>
+    <a:masterClrMapping/>
+  </p:clrMapOvr>
+</p:sld>
+</file>
+
+<file path=ppt/slides/slide2.xml><?xml version="1.0" encoding="utf-8"?>
+<p:sld xmlns:a="http://schemas.openxmlformats.org/drawingml/2006/main" xmlns:r="http://schemas.openxmlformats.org/officeDocument/2006/relationships" xmlns:p="http://schemas.openxmlformats.org/presentationml/2006/main">
+  <p:cSld>
+    <p:spTree>
+      <p:nvGrpSpPr>
+        <p:cNvPr id="1" name=""/>
+        <p:cNvGrpSpPr/>
+        <p:nvPr/>
+      </p:nvGrpSpPr>
+      <p:grpSpPr>
+        <a:xfrm>
+          <a:off x="0" y="0"/>
+          <a:ext cx="0" cy="0"/>
+          <a:chOff x="0" y="0"/>
+          <a:chExt cx="0" cy="0"/>
+        </a:xfrm>
+      </p:grpSpPr>
+      <p:pic>
+        <p:nvPicPr>
+          <p:cNvPr id="1028" name="Picture 4"/>
+          <p:cNvPicPr>
+            <a:picLocks noChangeAspect="1" noChangeArrowheads="1"/>
+          </p:cNvPicPr>
+          <p:nvPr/>
+        </p:nvPicPr>
+        <p:blipFill>
+          <a:blip r:embed="rId2" cstate="print"/>
+          <a:srcRect/>
+          <a:stretch>
+            <a:fillRect/>
+          </a:stretch>
+        </p:blipFill>
+        <p:spPr bwMode="auto">
+          <a:xfrm>
+            <a:off x="1295400" y="2209800"/>
+            <a:ext cx="1828800" cy="1778000"/>
+          </a:xfrm>
+          <a:prstGeom prst="rect">
+            <a:avLst/>
+          </a:prstGeom>
+          <a:noFill/>
+          <a:ln w="9525">
+            <a:noFill/>
+            <a:miter lim="800000"/>
+            <a:headEnd/>
+            <a:tailEnd/>
+          </a:ln>
+        </p:spPr>
+      </p:pic>
+      <p:pic>
+        <p:nvPicPr>
+          <p:cNvPr id="1029" name="Picture 5"/>
+          <p:cNvPicPr>
+            <a:picLocks noChangeAspect="1" noChangeArrowheads="1"/>
+          </p:cNvPicPr>
+          <p:nvPr/>
+        </p:nvPicPr>
+        <p:blipFill>
+          <a:blip r:embed="rId3" cstate="print"/>
+          <a:srcRect/>
+          <a:stretch>
+            <a:fillRect/>
+          </a:stretch>
+        </p:blipFill>
+        <p:spPr bwMode="auto">
+          <a:xfrm>
+            <a:off x="4506237" y="1002268"/>
+            <a:ext cx="1828800" cy="1778000"/>
+          </a:xfrm>
+          <a:prstGeom prst="rect">
+            <a:avLst/>
+          </a:prstGeom>
+          <a:noFill/>
+          <a:ln w="9525">
+            <a:noFill/>
+            <a:miter lim="800000"/>
+            <a:headEnd/>
+            <a:tailEnd/>
+          </a:ln>
+        </p:spPr>
+      </p:pic>
+      <p:sp>
+        <p:nvSpPr>
+          <p:cNvPr id="9" name="TextBox 8"/>
+          <p:cNvSpPr txBox="1"/>
+          <p:nvPr/>
+        </p:nvSpPr>
+        <p:spPr>
+          <a:xfrm>
+            <a:off x="1371600" y="4495800"/>
+            <a:ext cx="1714043" cy="369332"/>
+          </a:xfrm>
+          <a:prstGeom prst="rect">
+            <a:avLst/>
+          </a:prstGeom>
+          <a:noFill/>
+        </p:spPr>
+        <p:txBody>
+          <a:bodyPr wrap="none" rtlCol="0">
+            <a:spAutoFit/>
+          </a:bodyPr>
+          <a:lstStyle/>
+          <a:p>
+            <a:r>
+              <a:rPr lang="en-US" dirty="0" smtClean="0"/>
+              <a:t>Microarray Data</a:t>
+            </a:r>
+            <a:endParaRPr lang="en-US" dirty="0" smtClean="0"/>
+          </a:p>
+        </p:txBody>
+      </p:sp>
+      <p:sp>
+        <p:nvSpPr>
+          <p:cNvPr id="10" name="TextBox 9"/>
+          <p:cNvSpPr txBox="1"/>
+          <p:nvPr/>
+        </p:nvSpPr>
+        <p:spPr>
+          <a:xfrm>
+            <a:off x="4277637" y="2819400"/>
+            <a:ext cx="2351763" cy="369332"/>
+          </a:xfrm>
+          <a:prstGeom prst="rect">
+            <a:avLst/>
+          </a:prstGeom>
+          <a:noFill/>
+        </p:spPr>
+        <p:txBody>
+          <a:bodyPr wrap="none" rtlCol="0">
+            <a:spAutoFit/>
+          </a:bodyPr>
+          <a:lstStyle/>
+          <a:p>
+            <a:r>
+              <a:rPr lang="en-US" dirty="0" smtClean="0"/>
+              <a:t>Inference by Clustering</a:t>
+            </a:r>
+          </a:p>
+        </p:txBody>
+      </p:sp>
+      <p:pic>
+        <p:nvPicPr>
+          <p:cNvPr id="11" name="Picture 3"/>
+          <p:cNvPicPr>
+            <a:picLocks noChangeAspect="1" noChangeArrowheads="1"/>
+          </p:cNvPicPr>
+          <p:nvPr/>
+        </p:nvPicPr>
+        <p:blipFill>
+          <a:blip r:embed="rId4" cstate="print"/>
+          <a:srcRect/>
+          <a:stretch>
+            <a:fillRect/>
+          </a:stretch>
+        </p:blipFill>
+        <p:spPr bwMode="auto">
+          <a:xfrm>
+            <a:off x="4495800" y="3733800"/>
+            <a:ext cx="1828800" cy="1778000"/>
+          </a:xfrm>
+          <a:prstGeom prst="rect">
+            <a:avLst/>
+          </a:prstGeom>
+          <a:noFill/>
+          <a:ln w="9525">
+            <a:noFill/>
+            <a:miter lim="800000"/>
+            <a:headEnd/>
+            <a:tailEnd/>
+          </a:ln>
+        </p:spPr>
+      </p:pic>
+      <p:sp>
+        <p:nvSpPr>
+          <p:cNvPr id="12" name="TextBox 11"/>
+          <p:cNvSpPr txBox="1"/>
+          <p:nvPr/>
+        </p:nvSpPr>
+        <p:spPr>
+          <a:xfrm>
+            <a:off x="4724400" y="5562600"/>
+            <a:ext cx="1546216" cy="369332"/>
+          </a:xfrm>
+          <a:prstGeom prst="rect">
+            <a:avLst/>
+          </a:prstGeom>
+          <a:noFill/>
+        </p:spPr>
+        <p:txBody>
+          <a:bodyPr wrap="none" rtlCol="0">
+            <a:spAutoFit/>
+          </a:bodyPr>
+          <a:lstStyle/>
+          <a:p>
+            <a:r>
+              <a:rPr lang="en-US" dirty="0" smtClean="0"/>
+              <a:t>Original Image</a:t>
+            </a:r>
+            <a:endParaRPr lang="en-US" dirty="0" smtClean="0"/>
+          </a:p>
+        </p:txBody>
+      </p:sp>
+    </p:spTree>
+    <p:extLst>
+      <p:ext uri="{BB962C8B-B14F-4D97-AF65-F5344CB8AC3E}">
+        <p14:creationId xmlns:p14="http://schemas.microsoft.com/office/powerpoint/2010/main" val="2572958194"/>
+      </p:ext>
+    </p:extLst>
   </p:cSld>
   <p:clrMapOvr>
     <a:masterClrMapping/>

</xml_diff>